<commit_message>
Se agrega sección de generación de clave de acceso
</commit_message>
<xml_diff>
--- a/taller-facturacion-electronica/doc/presentacion.pptx
+++ b/taller-facturacion-electronica/doc/presentacion.pptx
@@ -10574,7 +10574,7 @@
           <a:bodyPr/>
           <a:lstStyle/>
           <a:p>
-            <a:endParaRPr lang="es-EC"/>
+            <a:endParaRPr lang="es-EC" dirty="0"/>
           </a:p>
         </p:txBody>
       </p:sp>
@@ -10844,10 +10844,10 @@
               <a:t>Comprobante </a:t>
             </a:r>
             <a:r>
-              <a:rPr lang="es-EC" smtClean="0"/>
+              <a:rPr lang="es-EC" dirty="0" err="1" smtClean="0"/>
               <a:t>deretención</a:t>
             </a:r>
-            <a:endParaRPr lang="es-EC"/>
+            <a:endParaRPr lang="es-EC" dirty="0"/>
           </a:p>
         </p:txBody>
       </p:sp>

</xml_diff>